<commit_message>
update PPT, group 2
</commit_message>
<xml_diff>
--- a/weekly_report/group2/第5周汇报.pptx
+++ b/weekly_report/group2/第5周汇报.pptx
@@ -10,6 +10,7 @@
     <p:sldId id="263" r:id="rId4"/>
     <p:sldId id="264" r:id="rId5"/>
     <p:sldId id="265" r:id="rId6"/>
+    <p:sldId id="266" r:id="rId7"/>
   </p:sldIdLst>
   <p:sldSz cx="12192000" cy="6858000"/>
   <p:notesSz cx="6858000" cy="9144000"/>
@@ -4064,6 +4065,219 @@
 </p:sld>
 </file>
 
+<file path=ppt/slides/slide6.xml><?xml version="1.0" encoding="utf-8"?>
+<p:sld xmlns:a="http://schemas.openxmlformats.org/drawingml/2006/main" xmlns:r="http://schemas.openxmlformats.org/officeDocument/2006/relationships" xmlns:p="http://schemas.openxmlformats.org/presentationml/2006/main">
+  <p:cSld>
+    <p:spTree>
+      <p:nvGrpSpPr>
+        <p:cNvPr id="1" name=""/>
+        <p:cNvGrpSpPr/>
+        <p:nvPr/>
+      </p:nvGrpSpPr>
+      <p:grpSpPr>
+        <a:xfrm>
+          <a:off x="0" y="0"/>
+          <a:ext cx="0" cy="0"/>
+          <a:chOff x="0" y="0"/>
+          <a:chExt cx="0" cy="0"/>
+        </a:xfrm>
+      </p:grpSpPr>
+      <p:sp>
+        <p:nvSpPr>
+          <p:cNvPr id="2" name="标题 1">
+            <a:extLst>
+              <a:ext uri="{FF2B5EF4-FFF2-40B4-BE49-F238E27FC236}">
+                <a16:creationId xmlns:a16="http://schemas.microsoft.com/office/drawing/2014/main" id="{E8BFE98C-F375-4B23-952F-12380DF838B0}"/>
+              </a:ext>
+            </a:extLst>
+          </p:cNvPr>
+          <p:cNvSpPr>
+            <a:spLocks noGrp="1"/>
+          </p:cNvSpPr>
+          <p:nvPr>
+            <p:ph type="title"/>
+          </p:nvPr>
+        </p:nvSpPr>
+        <p:spPr/>
+        <p:txBody>
+          <a:bodyPr/>
+          <a:lstStyle/>
+          <a:p>
+            <a:r>
+              <a:rPr lang="en-US" altLang="zh-CN" dirty="0"/>
+              <a:t>Unit test</a:t>
+            </a:r>
+            <a:endParaRPr lang="zh-CN" altLang="en-US" dirty="0"/>
+          </a:p>
+        </p:txBody>
+      </p:sp>
+      <p:pic>
+        <p:nvPicPr>
+          <p:cNvPr id="4" name="内容占位符 3">
+            <a:extLst>
+              <a:ext uri="{FF2B5EF4-FFF2-40B4-BE49-F238E27FC236}">
+                <a16:creationId xmlns:a16="http://schemas.microsoft.com/office/drawing/2014/main" id="{84AA1750-10DB-4B25-9C84-F60682202B57}"/>
+              </a:ext>
+            </a:extLst>
+          </p:cNvPr>
+          <p:cNvPicPr>
+            <a:picLocks noGrp="1" noChangeAspect="1"/>
+          </p:cNvPicPr>
+          <p:nvPr>
+            <p:ph idx="1"/>
+          </p:nvPr>
+        </p:nvPicPr>
+        <p:blipFill>
+          <a:blip r:embed="rId2"/>
+          <a:stretch>
+            <a:fillRect/>
+          </a:stretch>
+        </p:blipFill>
+        <p:spPr>
+          <a:xfrm>
+            <a:off x="335881" y="2647742"/>
+            <a:ext cx="7429500" cy="3429000"/>
+          </a:xfrm>
+          <a:prstGeom prst="rect">
+            <a:avLst/>
+          </a:prstGeom>
+        </p:spPr>
+      </p:pic>
+      <p:grpSp>
+        <p:nvGrpSpPr>
+          <p:cNvPr id="11" name="组合 10">
+            <a:extLst>
+              <a:ext uri="{FF2B5EF4-FFF2-40B4-BE49-F238E27FC236}">
+                <a16:creationId xmlns:a16="http://schemas.microsoft.com/office/drawing/2014/main" id="{D80CD8AC-6DFC-41B4-96B1-0331EAD89CE3}"/>
+              </a:ext>
+            </a:extLst>
+          </p:cNvPr>
+          <p:cNvGrpSpPr/>
+          <p:nvPr/>
+        </p:nvGrpSpPr>
+        <p:grpSpPr>
+          <a:xfrm>
+            <a:off x="6616832" y="366703"/>
+            <a:ext cx="5206701" cy="3757318"/>
+            <a:chOff x="6616832" y="366703"/>
+            <a:chExt cx="5206701" cy="3757318"/>
+          </a:xfrm>
+        </p:grpSpPr>
+        <p:pic>
+          <p:nvPicPr>
+            <p:cNvPr id="5" name="图片 4">
+              <a:extLst>
+                <a:ext uri="{FF2B5EF4-FFF2-40B4-BE49-F238E27FC236}">
+                  <a16:creationId xmlns:a16="http://schemas.microsoft.com/office/drawing/2014/main" id="{3018517B-7F3C-4672-B6F8-85CB4273A45A}"/>
+                </a:ext>
+              </a:extLst>
+            </p:cNvPr>
+            <p:cNvPicPr>
+              <a:picLocks noChangeAspect="1"/>
+            </p:cNvPicPr>
+            <p:nvPr/>
+          </p:nvPicPr>
+          <p:blipFill>
+            <a:blip r:embed="rId3"/>
+            <a:stretch>
+              <a:fillRect/>
+            </a:stretch>
+          </p:blipFill>
+          <p:spPr>
+            <a:xfrm>
+              <a:off x="8607559" y="366703"/>
+              <a:ext cx="2388332" cy="904896"/>
+            </a:xfrm>
+            <a:prstGeom prst="rect">
+              <a:avLst/>
+            </a:prstGeom>
+          </p:spPr>
+        </p:pic>
+        <p:pic>
+          <p:nvPicPr>
+            <p:cNvPr id="6" name="图片 5">
+              <a:extLst>
+                <a:ext uri="{FF2B5EF4-FFF2-40B4-BE49-F238E27FC236}">
+                  <a16:creationId xmlns:a16="http://schemas.microsoft.com/office/drawing/2014/main" id="{B130AC36-ACE6-445D-A541-5E4524AB591C}"/>
+                </a:ext>
+              </a:extLst>
+            </p:cNvPr>
+            <p:cNvPicPr>
+              <a:picLocks noChangeAspect="1"/>
+            </p:cNvPicPr>
+            <p:nvPr/>
+          </p:nvPicPr>
+          <p:blipFill>
+            <a:blip r:embed="rId4"/>
+            <a:stretch>
+              <a:fillRect/>
+            </a:stretch>
+          </p:blipFill>
+          <p:spPr>
+            <a:xfrm>
+              <a:off x="6616832" y="2617401"/>
+              <a:ext cx="5206701" cy="1506620"/>
+            </a:xfrm>
+            <a:prstGeom prst="rect">
+              <a:avLst/>
+            </a:prstGeom>
+          </p:spPr>
+        </p:pic>
+        <p:cxnSp>
+          <p:nvCxnSpPr>
+            <p:cNvPr id="8" name="直接箭头连接符 7">
+              <a:extLst>
+                <a:ext uri="{FF2B5EF4-FFF2-40B4-BE49-F238E27FC236}">
+                  <a16:creationId xmlns:a16="http://schemas.microsoft.com/office/drawing/2014/main" id="{6A459EFC-6C62-4763-A20A-36EF41C0C6CC}"/>
+                </a:ext>
+              </a:extLst>
+            </p:cNvPr>
+            <p:cNvCxnSpPr>
+              <a:cxnSpLocks/>
+            </p:cNvCxnSpPr>
+            <p:nvPr/>
+          </p:nvCxnSpPr>
+          <p:spPr>
+            <a:xfrm>
+              <a:off x="9817766" y="1379621"/>
+              <a:ext cx="0" cy="1129758"/>
+            </a:xfrm>
+            <a:prstGeom prst="straightConnector1">
+              <a:avLst/>
+            </a:prstGeom>
+            <a:ln>
+              <a:tailEnd type="triangle"/>
+            </a:ln>
+          </p:spPr>
+          <p:style>
+            <a:lnRef idx="1">
+              <a:schemeClr val="accent1"/>
+            </a:lnRef>
+            <a:fillRef idx="0">
+              <a:schemeClr val="accent1"/>
+            </a:fillRef>
+            <a:effectRef idx="0">
+              <a:schemeClr val="accent1"/>
+            </a:effectRef>
+            <a:fontRef idx="minor">
+              <a:schemeClr val="tx1"/>
+            </a:fontRef>
+          </p:style>
+        </p:cxnSp>
+      </p:grpSp>
+    </p:spTree>
+    <p:extLst>
+      <p:ext uri="{BB962C8B-B14F-4D97-AF65-F5344CB8AC3E}">
+        <p14:creationId xmlns:p14="http://schemas.microsoft.com/office/powerpoint/2010/main" val="157603284"/>
+      </p:ext>
+    </p:extLst>
+  </p:cSld>
+  <p:clrMapOvr>
+    <a:masterClrMapping/>
+  </p:clrMapOvr>
+</p:sld>
+</file>
+
 <file path=ppt/theme/theme1.xml><?xml version="1.0" encoding="utf-8"?>
 <a:theme xmlns:a="http://schemas.openxmlformats.org/drawingml/2006/main" name="Office 主题​​">
   <a:themeElements>

</xml_diff>